<commit_message>
Added defense presentation slides
</commit_message>
<xml_diff>
--- a/docs/DefensePresentation.pptx
+++ b/docs/DefensePresentation.pptx
@@ -1,6 +1,6 @@
 
 <file path=ppt/presentation.xml><?xml version="1.0" encoding="utf-8"?>
-<p:presentation xmlns:a="http://schemas.openxmlformats.org/drawingml/2006/main" xmlns:r="http://schemas.openxmlformats.org/officeDocument/2006/relationships" xmlns:p="http://schemas.openxmlformats.org/presentationml/2006/main" saveSubsetFonts="1" autoCompressPictures="0">
+<p:presentation xmlns:a="http://schemas.openxmlformats.org/drawingml/2006/main" xmlns:r="http://schemas.openxmlformats.org/officeDocument/2006/relationships" xmlns:p="http://schemas.openxmlformats.org/presentationml/2006/main" showSpecialPlsOnTitleSld="0" saveSubsetFonts="1" autoCompressPictures="0">
   <p:sldMasterIdLst>
     <p:sldMasterId id="2147483925" r:id="rId1"/>
   </p:sldMasterIdLst>
@@ -207,7 +207,7 @@
           <a:p>
             <a:fld id="{9F2AA623-83E2-5B4C-9871-6B9FE2F33698}" type="datetimeFigureOut">
               <a:rPr lang="en-US" smtClean="0"/>
-              <a:t>4/7/24</a:t>
+              <a:t>4/10/24</a:t>
             </a:fld>
             <a:endParaRPr lang="en-US"/>
           </a:p>
@@ -1567,9 +1567,9 @@
           <a:bodyPr/>
           <a:lstStyle/>
           <a:p>
-            <a:fld id="{9D0D92BC-42A9-434B-8530-ADBF4485E407}" type="datetimeFigureOut">
+            <a:fld id="{5112C2C3-EDF5-5742-B8CF-217C2D7F2124}" type="datetime1">
               <a:rPr lang="en-US" smtClean="0"/>
-              <a:t>4/7/24</a:t>
+              <a:t>4/10/24</a:t>
             </a:fld>
             <a:endParaRPr lang="en-US"/>
           </a:p>
@@ -1818,9 +1818,9 @@
           <a:bodyPr/>
           <a:lstStyle/>
           <a:p>
-            <a:fld id="{9D0D92BC-42A9-434B-8530-ADBF4485E407}" type="datetimeFigureOut">
+            <a:fld id="{413D0289-A9AA-3642-8936-0B27F6895909}" type="datetime1">
               <a:rPr lang="en-US" smtClean="0"/>
-              <a:t>4/7/24</a:t>
+              <a:t>4/10/24</a:t>
             </a:fld>
             <a:endParaRPr lang="en-US"/>
           </a:p>
@@ -2026,9 +2026,9 @@
           <a:bodyPr/>
           <a:lstStyle/>
           <a:p>
-            <a:fld id="{9D0D92BC-42A9-434B-8530-ADBF4485E407}" type="datetimeFigureOut">
+            <a:fld id="{24058E6F-4926-784C-B033-8B6522DF7052}" type="datetime1">
               <a:rPr lang="en-US" smtClean="0"/>
-              <a:t>4/7/24</a:t>
+              <a:t>4/10/24</a:t>
             </a:fld>
             <a:endParaRPr lang="en-US"/>
           </a:p>
@@ -2224,9 +2224,9 @@
           <a:bodyPr/>
           <a:lstStyle/>
           <a:p>
-            <a:fld id="{9D0D92BC-42A9-434B-8530-ADBF4485E407}" type="datetimeFigureOut">
+            <a:fld id="{0B9D7A70-FEF4-9D4D-AB52-EF72A24C939D}" type="datetime1">
               <a:rPr lang="en-US" smtClean="0"/>
-              <a:t>4/7/24</a:t>
+              <a:t>4/10/24</a:t>
             </a:fld>
             <a:endParaRPr lang="en-US"/>
           </a:p>
@@ -2504,9 +2504,9 @@
           <a:bodyPr/>
           <a:lstStyle/>
           <a:p>
-            <a:fld id="{9D0D92BC-42A9-434B-8530-ADBF4485E407}" type="datetimeFigureOut">
+            <a:fld id="{1BD9395A-6EBD-AD4E-9A43-282B70C6E441}" type="datetime1">
               <a:rPr lang="en-US" smtClean="0"/>
-              <a:t>4/7/24</a:t>
+              <a:t>4/10/24</a:t>
             </a:fld>
             <a:endParaRPr lang="en-US"/>
           </a:p>
@@ -2812,9 +2812,9 @@
           <a:bodyPr/>
           <a:lstStyle/>
           <a:p>
-            <a:fld id="{9D0D92BC-42A9-434B-8530-ADBF4485E407}" type="datetimeFigureOut">
+            <a:fld id="{26257231-77B0-7E42-BF86-BE895E882EFC}" type="datetime1">
               <a:rPr lang="en-US" smtClean="0"/>
-              <a:t>4/7/24</a:t>
+              <a:t>4/10/24</a:t>
             </a:fld>
             <a:endParaRPr lang="en-US"/>
           </a:p>
@@ -3232,9 +3232,9 @@
           <a:bodyPr/>
           <a:lstStyle/>
           <a:p>
-            <a:fld id="{9D0D92BC-42A9-434B-8530-ADBF4485E407}" type="datetimeFigureOut">
+            <a:fld id="{854A59ED-D031-7D43-B22F-F3F2306011E0}" type="datetime1">
               <a:rPr lang="en-US" smtClean="0"/>
-              <a:t>4/7/24</a:t>
+              <a:t>4/10/24</a:t>
             </a:fld>
             <a:endParaRPr lang="en-US"/>
           </a:p>
@@ -3464,9 +3464,9 @@
           <a:bodyPr/>
           <a:lstStyle/>
           <a:p>
-            <a:fld id="{9D0D92BC-42A9-434B-8530-ADBF4485E407}" type="datetimeFigureOut">
+            <a:fld id="{2E34B0DB-59E8-C74F-92E5-3CE30CED5157}" type="datetime1">
               <a:rPr lang="en-US" smtClean="0"/>
-              <a:t>4/7/24</a:t>
+              <a:t>4/10/24</a:t>
             </a:fld>
             <a:endParaRPr lang="en-US"/>
           </a:p>
@@ -3577,9 +3577,9 @@
           <a:bodyPr/>
           <a:lstStyle/>
           <a:p>
-            <a:fld id="{9D0D92BC-42A9-434B-8530-ADBF4485E407}" type="datetimeFigureOut">
+            <a:fld id="{CE03943F-6258-3F45-A2CC-DA51CF4B3146}" type="datetime1">
               <a:rPr lang="en-US" smtClean="0"/>
-              <a:t>4/7/24</a:t>
+              <a:t>4/10/24</a:t>
             </a:fld>
             <a:endParaRPr lang="en-US"/>
           </a:p>
@@ -3894,9 +3894,9 @@
           <a:bodyPr/>
           <a:lstStyle/>
           <a:p>
-            <a:fld id="{9D0D92BC-42A9-434B-8530-ADBF4485E407}" type="datetimeFigureOut">
+            <a:fld id="{820CD85E-4A64-D743-A751-2334AD52F354}" type="datetime1">
               <a:rPr lang="en-US" smtClean="0"/>
-              <a:t>4/7/24</a:t>
+              <a:t>4/10/24</a:t>
             </a:fld>
             <a:endParaRPr lang="en-US"/>
           </a:p>
@@ -4186,9 +4186,9 @@
           <a:bodyPr/>
           <a:lstStyle/>
           <a:p>
-            <a:fld id="{9D0D92BC-42A9-434B-8530-ADBF4485E407}" type="datetimeFigureOut">
+            <a:fld id="{E4F4AEB7-BA9A-8B4A-97A5-A273059CD11F}" type="datetime1">
               <a:rPr lang="en-US" smtClean="0"/>
-              <a:t>4/7/24</a:t>
+              <a:t>4/10/24</a:t>
             </a:fld>
             <a:endParaRPr lang="en-US"/>
           </a:p>
@@ -4519,10 +4519,9 @@
             </a:lvl1pPr>
           </a:lstStyle>
           <a:p>
-            <a:fld id="{9D0D92BC-42A9-434B-8530-ADBF4485E407}" type="datetimeFigureOut">
+            <a:fld id="{99EE4128-14F9-A34F-8D61-27E86C09BC47}" type="datetime1">
               <a:rPr lang="en-US" smtClean="0"/>
-              <a:pPr/>
-              <a:t>4/7/24</a:t>
+              <a:t>4/10/24</a:t>
             </a:fld>
             <a:endParaRPr lang="en-US" dirty="0"/>
           </a:p>
@@ -4637,6 +4636,7 @@
     <p:sldLayoutId id="2147483923" r:id="rId10"/>
     <p:sldLayoutId id="2147483922" r:id="rId11"/>
   </p:sldLayoutIdLst>
+  <p:hf hdr="0" ftr="0" dt="0"/>
   <p:txStyles>
     <p:titleStyle>
       <a:lvl1pPr algn="l" defTabSz="914400" rtl="0" eaLnBrk="1" latinLnBrk="0" hangingPunct="1">
@@ -5153,8 +5153,8 @@
         </p:nvSpPr>
         <p:spPr>
           <a:xfrm>
-            <a:off x="2238807" y="5463009"/>
-            <a:ext cx="7714388" cy="1048006"/>
+            <a:off x="2238806" y="5312898"/>
+            <a:ext cx="7714388" cy="1432080"/>
           </a:xfrm>
         </p:spPr>
         <p:txBody>
@@ -5169,7 +5169,7 @@
               </a:lnSpc>
             </a:pPr>
             <a:r>
-              <a:rPr lang="en-US" sz="1700" dirty="0"/>
+              <a:rPr lang="en-US" dirty="0"/>
               <a:t>By Logan Ferguson</a:t>
             </a:r>
           </a:p>
@@ -5180,8 +5180,8 @@
               </a:lnSpc>
             </a:pPr>
             <a:r>
-              <a:rPr lang="en-US" sz="1700" dirty="0"/>
-              <a:t>Major: Cybersecurity</a:t>
+              <a:rPr lang="en-US" dirty="0"/>
+              <a:t>Project Advisor: Dr. Sean Hayes</a:t>
             </a:r>
           </a:p>
           <a:p>
@@ -5191,7 +5191,18 @@
               </a:lnSpc>
             </a:pPr>
             <a:r>
-              <a:rPr lang="en-US" sz="1700" dirty="0"/>
+              <a:rPr lang="en-US" dirty="0"/>
+              <a:t>Major: Cybersecurity</a:t>
+            </a:r>
+          </a:p>
+          <a:p>
+            <a:pPr algn="ctr">
+              <a:lnSpc>
+                <a:spcPct val="110000"/>
+              </a:lnSpc>
+            </a:pPr>
+            <a:r>
+              <a:rPr lang="en-US" dirty="0"/>
               <a:t>April 17, 2024</a:t>
             </a:r>
           </a:p>
@@ -5652,6 +5663,40 @@
           </a:p>
         </p:txBody>
       </p:sp>
+      <p:sp>
+        <p:nvSpPr>
+          <p:cNvPr id="5" name="Slide Number Placeholder 4">
+            <a:extLst>
+              <a:ext uri="{FF2B5EF4-FFF2-40B4-BE49-F238E27FC236}">
+                <a16:creationId xmlns:a16="http://schemas.microsoft.com/office/drawing/2014/main" id="{3857053F-B2CB-4142-B9A1-BD90D39D04B0}"/>
+              </a:ext>
+            </a:extLst>
+          </p:cNvPr>
+          <p:cNvSpPr>
+            <a:spLocks noGrp="1"/>
+          </p:cNvSpPr>
+          <p:nvPr>
+            <p:ph type="sldNum" sz="quarter" idx="12"/>
+          </p:nvPr>
+        </p:nvSpPr>
+        <p:spPr>
+          <a:xfrm>
+            <a:off x="11658601" y="6492875"/>
+            <a:ext cx="533399" cy="365125"/>
+          </a:xfrm>
+        </p:spPr>
+        <p:txBody>
+          <a:bodyPr/>
+          <a:lstStyle/>
+          <a:p>
+            <a:fld id="{A0289F9E-9962-4B7B-BA18-A15907CCC6BF}" type="slidenum">
+              <a:rPr lang="en-US" smtClean="0"/>
+              <a:t>10</a:t>
+            </a:fld>
+            <a:endParaRPr lang="en-US"/>
+          </a:p>
+        </p:txBody>
+      </p:sp>
     </p:spTree>
     <p:extLst>
       <p:ext uri="{BB962C8B-B14F-4D97-AF65-F5344CB8AC3E}">
@@ -6446,6 +6491,40 @@
           </a:p>
         </p:txBody>
       </p:sp>
+      <p:sp>
+        <p:nvSpPr>
+          <p:cNvPr id="5" name="Slide Number Placeholder 4">
+            <a:extLst>
+              <a:ext uri="{FF2B5EF4-FFF2-40B4-BE49-F238E27FC236}">
+                <a16:creationId xmlns:a16="http://schemas.microsoft.com/office/drawing/2014/main" id="{4FBEAF39-0FC6-5FD6-F668-6CDCBBBBACBC}"/>
+              </a:ext>
+            </a:extLst>
+          </p:cNvPr>
+          <p:cNvSpPr>
+            <a:spLocks noGrp="1"/>
+          </p:cNvSpPr>
+          <p:nvPr>
+            <p:ph type="sldNum" sz="quarter" idx="12"/>
+          </p:nvPr>
+        </p:nvSpPr>
+        <p:spPr>
+          <a:xfrm>
+            <a:off x="11658601" y="6492875"/>
+            <a:ext cx="533399" cy="365125"/>
+          </a:xfrm>
+        </p:spPr>
+        <p:txBody>
+          <a:bodyPr/>
+          <a:lstStyle/>
+          <a:p>
+            <a:fld id="{A0289F9E-9962-4B7B-BA18-A15907CCC6BF}" type="slidenum">
+              <a:rPr lang="en-US" smtClean="0"/>
+              <a:t>2</a:t>
+            </a:fld>
+            <a:endParaRPr lang="en-US" dirty="0"/>
+          </a:p>
+        </p:txBody>
+      </p:sp>
     </p:spTree>
     <p:extLst>
       <p:ext uri="{BB962C8B-B14F-4D97-AF65-F5344CB8AC3E}">
@@ -6645,6 +6724,40 @@
           </a:prstGeom>
         </p:spPr>
       </p:pic>
+      <p:sp>
+        <p:nvSpPr>
+          <p:cNvPr id="3" name="Slide Number Placeholder 2">
+            <a:extLst>
+              <a:ext uri="{FF2B5EF4-FFF2-40B4-BE49-F238E27FC236}">
+                <a16:creationId xmlns:a16="http://schemas.microsoft.com/office/drawing/2014/main" id="{9E9C847F-C6B7-E4AC-034A-6D58D188663E}"/>
+              </a:ext>
+            </a:extLst>
+          </p:cNvPr>
+          <p:cNvSpPr>
+            <a:spLocks noGrp="1"/>
+          </p:cNvSpPr>
+          <p:nvPr>
+            <p:ph type="sldNum" sz="quarter" idx="12"/>
+          </p:nvPr>
+        </p:nvSpPr>
+        <p:spPr>
+          <a:xfrm>
+            <a:off x="11658601" y="6492875"/>
+            <a:ext cx="533399" cy="365125"/>
+          </a:xfrm>
+        </p:spPr>
+        <p:txBody>
+          <a:bodyPr/>
+          <a:lstStyle/>
+          <a:p>
+            <a:fld id="{A0289F9E-9962-4B7B-BA18-A15907CCC6BF}" type="slidenum">
+              <a:rPr lang="en-US" smtClean="0"/>
+              <a:t>3</a:t>
+            </a:fld>
+            <a:endParaRPr lang="en-US"/>
+          </a:p>
+        </p:txBody>
+      </p:sp>
     </p:spTree>
     <p:extLst>
       <p:ext uri="{BB962C8B-B14F-4D97-AF65-F5344CB8AC3E}">
@@ -6805,6 +6918,40 @@
           </a:p>
         </p:txBody>
       </p:sp>
+      <p:sp>
+        <p:nvSpPr>
+          <p:cNvPr id="3" name="Slide Number Placeholder 2">
+            <a:extLst>
+              <a:ext uri="{FF2B5EF4-FFF2-40B4-BE49-F238E27FC236}">
+                <a16:creationId xmlns:a16="http://schemas.microsoft.com/office/drawing/2014/main" id="{CC316558-D6F6-F0CA-B872-D0B8FD93347F}"/>
+              </a:ext>
+            </a:extLst>
+          </p:cNvPr>
+          <p:cNvSpPr>
+            <a:spLocks noGrp="1"/>
+          </p:cNvSpPr>
+          <p:nvPr>
+            <p:ph type="sldNum" sz="quarter" idx="12"/>
+          </p:nvPr>
+        </p:nvSpPr>
+        <p:spPr>
+          <a:xfrm>
+            <a:off x="11658601" y="6492875"/>
+            <a:ext cx="533399" cy="365125"/>
+          </a:xfrm>
+        </p:spPr>
+        <p:txBody>
+          <a:bodyPr/>
+          <a:lstStyle/>
+          <a:p>
+            <a:fld id="{A0289F9E-9962-4B7B-BA18-A15907CCC6BF}" type="slidenum">
+              <a:rPr lang="en-US" smtClean="0"/>
+              <a:t>4</a:t>
+            </a:fld>
+            <a:endParaRPr lang="en-US"/>
+          </a:p>
+        </p:txBody>
+      </p:sp>
     </p:spTree>
     <p:extLst>
       <p:ext uri="{BB962C8B-B14F-4D97-AF65-F5344CB8AC3E}">
@@ -6957,6 +7104,40 @@
               <a:rPr lang="en-US" dirty="0"/>
               <a:t>Goal: To create a password manager that provides security, integrity, and ease of usability</a:t>
             </a:r>
+          </a:p>
+        </p:txBody>
+      </p:sp>
+      <p:sp>
+        <p:nvSpPr>
+          <p:cNvPr id="4" name="Slide Number Placeholder 3">
+            <a:extLst>
+              <a:ext uri="{FF2B5EF4-FFF2-40B4-BE49-F238E27FC236}">
+                <a16:creationId xmlns:a16="http://schemas.microsoft.com/office/drawing/2014/main" id="{5C6FB513-1651-8EB2-937D-CD9986C1755B}"/>
+              </a:ext>
+            </a:extLst>
+          </p:cNvPr>
+          <p:cNvSpPr>
+            <a:spLocks noGrp="1"/>
+          </p:cNvSpPr>
+          <p:nvPr>
+            <p:ph type="sldNum" sz="quarter" idx="12"/>
+          </p:nvPr>
+        </p:nvSpPr>
+        <p:spPr>
+          <a:xfrm>
+            <a:off x="11658601" y="6492875"/>
+            <a:ext cx="533399" cy="365125"/>
+          </a:xfrm>
+        </p:spPr>
+        <p:txBody>
+          <a:bodyPr/>
+          <a:lstStyle/>
+          <a:p>
+            <a:fld id="{A0289F9E-9962-4B7B-BA18-A15907CCC6BF}" type="slidenum">
+              <a:rPr lang="en-US" smtClean="0"/>
+              <a:t>5</a:t>
+            </a:fld>
+            <a:endParaRPr lang="en-US"/>
           </a:p>
         </p:txBody>
       </p:sp>
@@ -7000,10 +7181,10 @@
       </p:grpSpPr>
       <p:sp useBgFill="1">
         <p:nvSpPr>
-          <p:cNvPr id="15" name="Rectangle 14">
-            <a:extLst>
-              <a:ext uri="{FF2B5EF4-FFF2-40B4-BE49-F238E27FC236}">
-                <a16:creationId xmlns:a16="http://schemas.microsoft.com/office/drawing/2014/main" id="{5669F72C-E3FB-4C48-AEBD-AF7AC0D749C7}"/>
+          <p:cNvPr id="24" name="Rectangle 23">
+            <a:extLst>
+              <a:ext uri="{FF2B5EF4-FFF2-40B4-BE49-F238E27FC236}">
+                <a16:creationId xmlns:a16="http://schemas.microsoft.com/office/drawing/2014/main" id="{9184DF83-39E6-4BDC-9E23-17F25AB44C55}"/>
               </a:ext>
               <a:ext uri="{C183D7F6-B498-43B3-948B-1728B52AA6E4}">
                 <adec:decorative xmlns:adec="http://schemas.microsoft.com/office/drawing/2017/decorative" val="1"/>
@@ -7076,10 +7257,104 @@
       </p:sp>
       <p:sp>
         <p:nvSpPr>
-          <p:cNvPr id="17" name="Rectangle 16">
-            <a:extLst>
-              <a:ext uri="{FF2B5EF4-FFF2-40B4-BE49-F238E27FC236}">
-                <a16:creationId xmlns:a16="http://schemas.microsoft.com/office/drawing/2014/main" id="{0273E372-AAE1-7E3A-D35A-832630F6DB6C}"/>
+          <p:cNvPr id="2" name="Title 1">
+            <a:extLst>
+              <a:ext uri="{FF2B5EF4-FFF2-40B4-BE49-F238E27FC236}">
+                <a16:creationId xmlns:a16="http://schemas.microsoft.com/office/drawing/2014/main" id="{DF9F5F37-6D34-8C10-E116-B36DC5004870}"/>
+              </a:ext>
+            </a:extLst>
+          </p:cNvPr>
+          <p:cNvSpPr>
+            <a:spLocks noGrp="1"/>
+          </p:cNvSpPr>
+          <p:nvPr>
+            <p:ph type="title"/>
+          </p:nvPr>
+        </p:nvSpPr>
+        <p:spPr>
+          <a:xfrm>
+            <a:off x="7034246" y="762001"/>
+            <a:ext cx="4242400" cy="1141004"/>
+          </a:xfrm>
+        </p:spPr>
+        <p:txBody>
+          <a:bodyPr>
+            <a:normAutofit/>
+          </a:bodyPr>
+          <a:lstStyle/>
+          <a:p>
+            <a:r>
+              <a:rPr lang="en-US" dirty="0"/>
+              <a:t>What is Keyguardian?</a:t>
+            </a:r>
+            <a:endParaRPr lang="en-US"/>
+          </a:p>
+        </p:txBody>
+      </p:sp>
+      <p:pic>
+        <p:nvPicPr>
+          <p:cNvPr id="4" name="Content Placeholder 4" descr="A shield with a lock on it&#10;&#10;Description automatically generated">
+            <a:extLst>
+              <a:ext uri="{FF2B5EF4-FFF2-40B4-BE49-F238E27FC236}">
+                <a16:creationId xmlns:a16="http://schemas.microsoft.com/office/drawing/2014/main" id="{C155BA63-A4CC-9CB7-31DA-2D9379D5ABFF}"/>
+              </a:ext>
+            </a:extLst>
+          </p:cNvPr>
+          <p:cNvPicPr>
+            <a:picLocks noChangeAspect="1"/>
+          </p:cNvPicPr>
+          <p:nvPr/>
+        </p:nvPicPr>
+        <p:blipFill rotWithShape="1">
+          <a:blip r:embed="rId3"/>
+          <a:srcRect l="2991" r="3986" b="-3"/>
+          <a:stretch/>
+        </p:blipFill>
+        <p:spPr>
+          <a:xfrm>
+            <a:off x="10565943" y="379006"/>
+            <a:ext cx="1168380" cy="659425"/>
+          </a:xfrm>
+          <a:prstGeom prst="rect">
+            <a:avLst/>
+          </a:prstGeom>
+        </p:spPr>
+      </p:pic>
+      <p:pic>
+        <p:nvPicPr>
+          <p:cNvPr id="7" name="Picture 6" descr="A screenshot of a computer&#10;&#10;Description automatically generated">
+            <a:extLst>
+              <a:ext uri="{FF2B5EF4-FFF2-40B4-BE49-F238E27FC236}">
+                <a16:creationId xmlns:a16="http://schemas.microsoft.com/office/drawing/2014/main" id="{A1391331-8D31-8691-BCF3-C97D7CC3C99B}"/>
+              </a:ext>
+            </a:extLst>
+          </p:cNvPr>
+          <p:cNvPicPr>
+            <a:picLocks noChangeAspect="1"/>
+          </p:cNvPicPr>
+          <p:nvPr/>
+        </p:nvPicPr>
+        <p:blipFill rotWithShape="1">
+          <a:blip r:embed="rId4"/>
+          <a:srcRect/>
+          <a:stretch/>
+        </p:blipFill>
+        <p:spPr>
+          <a:xfrm>
+            <a:off x="-32629" y="1791452"/>
+            <a:ext cx="6118892" cy="3640219"/>
+          </a:xfrm>
+          <a:prstGeom prst="rect">
+            <a:avLst/>
+          </a:prstGeom>
+        </p:spPr>
+      </p:pic>
+      <p:sp>
+        <p:nvSpPr>
+          <p:cNvPr id="26" name="Rectangle 25">
+            <a:extLst>
+              <a:ext uri="{FF2B5EF4-FFF2-40B4-BE49-F238E27FC236}">
+                <a16:creationId xmlns:a16="http://schemas.microsoft.com/office/drawing/2014/main" id="{102E1699-0830-EE28-6BA6-C87CE22D3610}"/>
               </a:ext>
               <a:ext uri="{C183D7F6-B498-43B3-948B-1728B52AA6E4}">
                 <adec:decorative xmlns:adec="http://schemas.microsoft.com/office/drawing/2017/decorative" val="1"/>
@@ -7099,21 +7374,33 @@
         </p:nvSpPr>
         <p:spPr>
           <a:xfrm>
-            <a:off x="0" y="0"/>
-            <a:ext cx="6096000" cy="6858000"/>
+            <a:off x="6096000" y="3229317"/>
+            <a:ext cx="6096000" cy="3640219"/>
           </a:xfrm>
           <a:prstGeom prst="rect">
             <a:avLst/>
           </a:prstGeom>
-          <a:solidFill>
-            <a:schemeClr val="bg1"/>
-          </a:solidFill>
-          <a:ln w="12700" cap="flat" cmpd="sng" algn="ctr">
+          <a:gradFill>
+            <a:gsLst>
+              <a:gs pos="14000">
+                <a:schemeClr val="accent1">
+                  <a:lumMod val="60000"/>
+                  <a:lumOff val="40000"/>
+                  <a:alpha val="0"/>
+                </a:schemeClr>
+              </a:gs>
+              <a:gs pos="100000">
+                <a:schemeClr val="accent1">
+                  <a:lumMod val="60000"/>
+                  <a:lumOff val="40000"/>
+                </a:schemeClr>
+              </a:gs>
+            </a:gsLst>
+            <a:lin ang="5400000" scaled="1"/>
+          </a:gradFill>
+          <a:ln>
             <a:noFill/>
-            <a:prstDash val="solid"/>
-            <a:miter lim="800000"/>
           </a:ln>
-          <a:effectLst/>
         </p:spPr>
         <p:style>
           <a:lnRef idx="2">
@@ -7136,249 +7423,148 @@
           <a:lstStyle/>
           <a:p>
             <a:pPr algn="ctr"/>
-            <a:endParaRPr lang="en-US"/>
-          </a:p>
-        </p:txBody>
-      </p:sp>
-      <p:sp>
-        <p:nvSpPr>
-          <p:cNvPr id="2" name="Title 1">
-            <a:extLst>
-              <a:ext uri="{FF2B5EF4-FFF2-40B4-BE49-F238E27FC236}">
-                <a16:creationId xmlns:a16="http://schemas.microsoft.com/office/drawing/2014/main" id="{DF9F5F37-6D34-8C10-E116-B36DC5004870}"/>
-              </a:ext>
-            </a:extLst>
-          </p:cNvPr>
-          <p:cNvSpPr>
-            <a:spLocks noGrp="1"/>
-          </p:cNvSpPr>
-          <p:nvPr>
-            <p:ph type="title"/>
+            <a:endParaRPr lang="en-US" dirty="0"/>
+          </a:p>
+        </p:txBody>
+      </p:sp>
+      <p:sp>
+        <p:nvSpPr>
+          <p:cNvPr id="3" name="Content Placeholder 2">
+            <a:extLst>
+              <a:ext uri="{FF2B5EF4-FFF2-40B4-BE49-F238E27FC236}">
+                <a16:creationId xmlns:a16="http://schemas.microsoft.com/office/drawing/2014/main" id="{EE8DC36E-3D01-70AA-D745-D57B816FFE22}"/>
+              </a:ext>
+            </a:extLst>
+          </p:cNvPr>
+          <p:cNvSpPr>
+            <a:spLocks noGrp="1"/>
+          </p:cNvSpPr>
+          <p:nvPr>
+            <p:ph idx="1"/>
           </p:nvPr>
         </p:nvSpPr>
         <p:spPr>
           <a:xfrm>
-            <a:off x="1043179" y="761999"/>
-            <a:ext cx="4009639" cy="1567543"/>
-          </a:xfrm>
-        </p:spPr>
-        <p:txBody>
-          <a:bodyPr anchor="ctr">
+            <a:off x="7038168" y="2286000"/>
+            <a:ext cx="4205849" cy="3810000"/>
+          </a:xfrm>
+        </p:spPr>
+        <p:txBody>
+          <a:bodyPr>
             <a:normAutofit/>
           </a:bodyPr>
           <a:lstStyle/>
           <a:p>
-            <a:pPr algn="ctr"/>
-            <a:r>
-              <a:rPr lang="en-US" dirty="0"/>
-              <a:t>What is Keyguardian?</a:t>
-            </a:r>
-          </a:p>
-        </p:txBody>
-      </p:sp>
-      <p:pic>
-        <p:nvPicPr>
-          <p:cNvPr id="4" name="Content Placeholder 4" descr="A shield with a lock on it&#10;&#10;Description automatically generated">
-            <a:extLst>
-              <a:ext uri="{FF2B5EF4-FFF2-40B4-BE49-F238E27FC236}">
-                <a16:creationId xmlns:a16="http://schemas.microsoft.com/office/drawing/2014/main" id="{C155BA63-A4CC-9CB7-31DA-2D9379D5ABFF}"/>
-              </a:ext>
-            </a:extLst>
-          </p:cNvPr>
-          <p:cNvPicPr>
-            <a:picLocks noChangeAspect="1"/>
-          </p:cNvPicPr>
-          <p:nvPr/>
-        </p:nvPicPr>
-        <p:blipFill>
-          <a:blip r:embed="rId3"/>
-          <a:stretch>
-            <a:fillRect/>
-          </a:stretch>
-        </p:blipFill>
+            <a:pPr>
+              <a:lnSpc>
+                <a:spcPct val="110000"/>
+              </a:lnSpc>
+            </a:pPr>
+            <a:r>
+              <a:rPr lang="en-US"/>
+              <a:t>Secure password manager, generator, and breach checker</a:t>
+            </a:r>
+          </a:p>
+          <a:p>
+            <a:pPr>
+              <a:lnSpc>
+                <a:spcPct val="110000"/>
+              </a:lnSpc>
+            </a:pPr>
+            <a:r>
+              <a:rPr lang="en-US"/>
+              <a:t>Developed in Python with many libraries</a:t>
+            </a:r>
+          </a:p>
+          <a:p>
+            <a:pPr>
+              <a:lnSpc>
+                <a:spcPct val="110000"/>
+              </a:lnSpc>
+            </a:pPr>
+            <a:r>
+              <a:rPr lang="en-US"/>
+              <a:t>Includes a GUI</a:t>
+            </a:r>
+          </a:p>
+          <a:p>
+            <a:pPr>
+              <a:lnSpc>
+                <a:spcPct val="110000"/>
+              </a:lnSpc>
+            </a:pPr>
+            <a:r>
+              <a:rPr lang="en-US"/>
+              <a:t>Storage database is local</a:t>
+            </a:r>
+          </a:p>
+          <a:p>
+            <a:pPr>
+              <a:lnSpc>
+                <a:spcPct val="110000"/>
+              </a:lnSpc>
+            </a:pPr>
+            <a:r>
+              <a:rPr lang="en-US"/>
+              <a:t>Generates passwords with length up to 35 characters</a:t>
+            </a:r>
+          </a:p>
+          <a:p>
+            <a:pPr>
+              <a:lnSpc>
+                <a:spcPct val="110000"/>
+              </a:lnSpc>
+            </a:pPr>
+            <a:r>
+              <a:rPr lang="en-US"/>
+              <a:t>Checks for common breached passwords</a:t>
+            </a:r>
+          </a:p>
+        </p:txBody>
+      </p:sp>
+      <p:sp>
+        <p:nvSpPr>
+          <p:cNvPr id="5" name="Slide Number Placeholder 4">
+            <a:extLst>
+              <a:ext uri="{FF2B5EF4-FFF2-40B4-BE49-F238E27FC236}">
+                <a16:creationId xmlns:a16="http://schemas.microsoft.com/office/drawing/2014/main" id="{319A0DEF-F7A2-EED3-BA48-2BD87C0EC80B}"/>
+              </a:ext>
+            </a:extLst>
+          </p:cNvPr>
+          <p:cNvSpPr>
+            <a:spLocks noGrp="1"/>
+          </p:cNvSpPr>
+          <p:nvPr>
+            <p:ph type="sldNum" sz="quarter" idx="12"/>
+          </p:nvPr>
+        </p:nvSpPr>
         <p:spPr>
           <a:xfrm>
-            <a:off x="1986456" y="2871690"/>
-            <a:ext cx="2123086" cy="1114620"/>
-          </a:xfrm>
-          <a:prstGeom prst="rect">
-            <a:avLst/>
-          </a:prstGeom>
-        </p:spPr>
-      </p:pic>
-      <p:sp>
-        <p:nvSpPr>
-          <p:cNvPr id="19" name="Rectangle 18">
-            <a:extLst>
-              <a:ext uri="{FF2B5EF4-FFF2-40B4-BE49-F238E27FC236}">
-                <a16:creationId xmlns:a16="http://schemas.microsoft.com/office/drawing/2014/main" id="{F9F3AB66-42CF-94B3-7050-9DDAFC451FAB}"/>
-              </a:ext>
-              <a:ext uri="{C183D7F6-B498-43B3-948B-1728B52AA6E4}">
-                <adec:decorative xmlns:adec="http://schemas.microsoft.com/office/drawing/2017/decorative" val="1"/>
-              </a:ext>
-            </a:extLst>
-          </p:cNvPr>
-          <p:cNvSpPr>
-            <a:spLocks noGrp="1" noRot="1" noChangeAspect="1" noMove="1" noResize="1" noEditPoints="1" noAdjustHandles="1" noChangeArrowheads="1" noChangeShapeType="1" noTextEdit="1"/>
-          </p:cNvSpPr>
-          <p:nvPr>
-            <p:extLst>
-              <p:ext uri="{386F3935-93C4-4BCD-93E2-E3B085C9AB24}">
-                <p16:designElem xmlns:p16="http://schemas.microsoft.com/office/powerpoint/2015/main" val="1"/>
-              </p:ext>
-            </p:extLst>
-          </p:nvPr>
-        </p:nvSpPr>
-        <p:spPr>
-          <a:xfrm>
-            <a:off x="6096001" y="0"/>
-            <a:ext cx="6095999" cy="6858000"/>
-          </a:xfrm>
-          <a:prstGeom prst="rect">
-            <a:avLst/>
-          </a:prstGeom>
-          <a:gradFill>
-            <a:gsLst>
-              <a:gs pos="20000">
-                <a:schemeClr val="accent1">
-                  <a:lumMod val="60000"/>
-                  <a:lumOff val="40000"/>
-                  <a:alpha val="0"/>
-                </a:schemeClr>
-              </a:gs>
-              <a:gs pos="90000">
-                <a:schemeClr val="accent1">
-                  <a:lumMod val="60000"/>
-                  <a:lumOff val="40000"/>
-                </a:schemeClr>
-              </a:gs>
-            </a:gsLst>
-            <a:lin ang="5400000" scaled="1"/>
-          </a:gradFill>
-          <a:ln w="12700" cap="flat" cmpd="sng" algn="ctr">
-            <a:noFill/>
-            <a:prstDash val="solid"/>
-            <a:miter lim="800000"/>
-          </a:ln>
-          <a:effectLst/>
-        </p:spPr>
-        <p:style>
-          <a:lnRef idx="2">
-            <a:schemeClr val="accent1">
-              <a:shade val="50000"/>
-            </a:schemeClr>
-          </a:lnRef>
-          <a:fillRef idx="1">
-            <a:schemeClr val="accent1"/>
-          </a:fillRef>
-          <a:effectRef idx="0">
-            <a:schemeClr val="accent1"/>
-          </a:effectRef>
-          <a:fontRef idx="minor">
-            <a:schemeClr val="lt1"/>
-          </a:fontRef>
-        </p:style>
-        <p:txBody>
-          <a:bodyPr rtlCol="0" anchor="ctr"/>
-          <a:lstStyle/>
-          <a:p>
-            <a:pPr algn="ctr"/>
-            <a:endParaRPr lang="en-US"/>
-          </a:p>
-        </p:txBody>
-      </p:sp>
-      <p:sp>
-        <p:nvSpPr>
-          <p:cNvPr id="3" name="Content Placeholder 2">
-            <a:extLst>
-              <a:ext uri="{FF2B5EF4-FFF2-40B4-BE49-F238E27FC236}">
-                <a16:creationId xmlns:a16="http://schemas.microsoft.com/office/drawing/2014/main" id="{EE8DC36E-3D01-70AA-D745-D57B816FFE22}"/>
-              </a:ext>
-            </a:extLst>
-          </p:cNvPr>
-          <p:cNvSpPr>
-            <a:spLocks noGrp="1"/>
-          </p:cNvSpPr>
-          <p:nvPr>
-            <p:ph idx="1"/>
-          </p:nvPr>
-        </p:nvSpPr>
-        <p:spPr>
-          <a:xfrm>
-            <a:off x="7048500" y="761999"/>
-            <a:ext cx="4200098" cy="5342721"/>
-          </a:xfrm>
-        </p:spPr>
-        <p:txBody>
-          <a:bodyPr anchor="ctr">
-            <a:normAutofit fontScale="92500" lnSpcReduction="20000"/>
+            <a:off x="11658601" y="6478994"/>
+            <a:ext cx="533399" cy="365125"/>
+          </a:xfrm>
+        </p:spPr>
+        <p:txBody>
+          <a:bodyPr>
+            <a:normAutofit/>
           </a:bodyPr>
           <a:lstStyle/>
           <a:p>
             <a:pPr>
-              <a:lnSpc>
-                <a:spcPct val="150000"/>
-              </a:lnSpc>
+              <a:spcAft>
+                <a:spcPts val="600"/>
+              </a:spcAft>
             </a:pPr>
-            <a:r>
-              <a:rPr lang="en-US" sz="2400" dirty="0"/>
-              <a:t>Secure password manager, generator, and breach checker</a:t>
-            </a:r>
-          </a:p>
-          <a:p>
-            <a:pPr>
-              <a:lnSpc>
-                <a:spcPct val="150000"/>
-              </a:lnSpc>
-            </a:pPr>
-            <a:r>
-              <a:rPr lang="en-US" sz="2400" dirty="0"/>
-              <a:t>Developed in Python with many libraries</a:t>
-            </a:r>
-          </a:p>
-          <a:p>
-            <a:pPr>
-              <a:lnSpc>
-                <a:spcPct val="150000"/>
-              </a:lnSpc>
-            </a:pPr>
-            <a:r>
-              <a:rPr lang="en-US" sz="2400" dirty="0"/>
-              <a:t>Includes a GUI</a:t>
-            </a:r>
-          </a:p>
-          <a:p>
-            <a:pPr>
-              <a:lnSpc>
-                <a:spcPct val="150000"/>
-              </a:lnSpc>
-            </a:pPr>
-            <a:r>
-              <a:rPr lang="en-US" sz="2400" dirty="0"/>
-              <a:t>Storage database is local</a:t>
-            </a:r>
-          </a:p>
-          <a:p>
-            <a:pPr>
-              <a:lnSpc>
-                <a:spcPct val="150000"/>
-              </a:lnSpc>
-            </a:pPr>
-            <a:r>
-              <a:rPr lang="en-US" sz="2400" dirty="0"/>
-              <a:t>Generates passwords with length up to 35 characters</a:t>
-            </a:r>
-          </a:p>
-          <a:p>
-            <a:pPr>
-              <a:lnSpc>
-                <a:spcPct val="150000"/>
-              </a:lnSpc>
-            </a:pPr>
-            <a:r>
-              <a:rPr lang="en-US" sz="2400" dirty="0"/>
-              <a:t>Checks for common breached passwords</a:t>
-            </a:r>
+            <a:fld id="{A0289F9E-9962-4B7B-BA18-A15907CCC6BF}" type="slidenum">
+              <a:rPr lang="en-US" smtClean="0"/>
+              <a:pPr>
+                <a:spcAft>
+                  <a:spcPts val="600"/>
+                </a:spcAft>
+              </a:pPr>
+              <a:t>6</a:t>
+            </a:fld>
+            <a:endParaRPr lang="en-US" dirty="0"/>
           </a:p>
         </p:txBody>
       </p:sp>
@@ -7510,6 +7696,40 @@
               <a:rPr lang="en-US" sz="2200" dirty="0"/>
               <a:t>Passwords only displayed if requirements met (ID#26)</a:t>
             </a:r>
+          </a:p>
+        </p:txBody>
+      </p:sp>
+      <p:sp>
+        <p:nvSpPr>
+          <p:cNvPr id="4" name="Slide Number Placeholder 3">
+            <a:extLst>
+              <a:ext uri="{FF2B5EF4-FFF2-40B4-BE49-F238E27FC236}">
+                <a16:creationId xmlns:a16="http://schemas.microsoft.com/office/drawing/2014/main" id="{8B3A8B79-9608-FB19-92D1-ECE09E33DCC2}"/>
+              </a:ext>
+            </a:extLst>
+          </p:cNvPr>
+          <p:cNvSpPr>
+            <a:spLocks noGrp="1"/>
+          </p:cNvSpPr>
+          <p:nvPr>
+            <p:ph type="sldNum" sz="quarter" idx="12"/>
+          </p:nvPr>
+        </p:nvSpPr>
+        <p:spPr>
+          <a:xfrm>
+            <a:off x="11658601" y="6447155"/>
+            <a:ext cx="533399" cy="365125"/>
+          </a:xfrm>
+        </p:spPr>
+        <p:txBody>
+          <a:bodyPr/>
+          <a:lstStyle/>
+          <a:p>
+            <a:fld id="{A0289F9E-9962-4B7B-BA18-A15907CCC6BF}" type="slidenum">
+              <a:rPr lang="en-US" smtClean="0"/>
+              <a:t>7</a:t>
+            </a:fld>
+            <a:endParaRPr lang="en-US"/>
           </a:p>
         </p:txBody>
       </p:sp>
@@ -8163,6 +8383,40 @@
           </a:extLst>
         </p:spPr>
       </p:pic>
+      <p:sp>
+        <p:nvSpPr>
+          <p:cNvPr id="6" name="Slide Number Placeholder 5">
+            <a:extLst>
+              <a:ext uri="{FF2B5EF4-FFF2-40B4-BE49-F238E27FC236}">
+                <a16:creationId xmlns:a16="http://schemas.microsoft.com/office/drawing/2014/main" id="{1D90D945-3484-DF47-A3C7-5D770D663C8A}"/>
+              </a:ext>
+            </a:extLst>
+          </p:cNvPr>
+          <p:cNvSpPr>
+            <a:spLocks noGrp="1"/>
+          </p:cNvSpPr>
+          <p:nvPr>
+            <p:ph type="sldNum" sz="quarter" idx="12"/>
+          </p:nvPr>
+        </p:nvSpPr>
+        <p:spPr>
+          <a:xfrm>
+            <a:off x="11637290" y="6477131"/>
+            <a:ext cx="533399" cy="365125"/>
+          </a:xfrm>
+        </p:spPr>
+        <p:txBody>
+          <a:bodyPr/>
+          <a:lstStyle/>
+          <a:p>
+            <a:fld id="{A0289F9E-9962-4B7B-BA18-A15907CCC6BF}" type="slidenum">
+              <a:rPr lang="en-US" smtClean="0"/>
+              <a:t>8</a:t>
+            </a:fld>
+            <a:endParaRPr lang="en-US"/>
+          </a:p>
+        </p:txBody>
+      </p:sp>
     </p:spTree>
     <p:extLst>
       <p:ext uri="{BB962C8B-B14F-4D97-AF65-F5344CB8AC3E}">
@@ -8671,6 +8925,40 @@
               <a:rPr lang="en-US" sz="2200" dirty="0"/>
               <a:t>Package versions</a:t>
             </a:r>
+          </a:p>
+        </p:txBody>
+      </p:sp>
+      <p:sp>
+        <p:nvSpPr>
+          <p:cNvPr id="3" name="Slide Number Placeholder 2">
+            <a:extLst>
+              <a:ext uri="{FF2B5EF4-FFF2-40B4-BE49-F238E27FC236}">
+                <a16:creationId xmlns:a16="http://schemas.microsoft.com/office/drawing/2014/main" id="{87D8D2D6-9E4C-744A-2877-28F13EDC84F7}"/>
+              </a:ext>
+            </a:extLst>
+          </p:cNvPr>
+          <p:cNvSpPr>
+            <a:spLocks noGrp="1"/>
+          </p:cNvSpPr>
+          <p:nvPr>
+            <p:ph type="sldNum" sz="quarter" idx="12"/>
+          </p:nvPr>
+        </p:nvSpPr>
+        <p:spPr>
+          <a:xfrm>
+            <a:off x="11658600" y="6492875"/>
+            <a:ext cx="533399" cy="365125"/>
+          </a:xfrm>
+        </p:spPr>
+        <p:txBody>
+          <a:bodyPr/>
+          <a:lstStyle/>
+          <a:p>
+            <a:fld id="{A0289F9E-9962-4B7B-BA18-A15907CCC6BF}" type="slidenum">
+              <a:rPr lang="en-US" smtClean="0"/>
+              <a:t>9</a:t>
+            </a:fld>
+            <a:endParaRPr lang="en-US"/>
           </a:p>
         </p:txBody>
       </p:sp>

</xml_diff>